<commit_message>
Activated link for DDD slides
</commit_message>
<xml_diff>
--- a/DependencyInjection.pptx
+++ b/DependencyInjection.pptx
@@ -228,7 +228,7 @@
           <a:p>
             <a:fld id="{01F0294A-36AA-4D1A-8E11-2BFB52900B55}" type="datetimeFigureOut">
               <a:rPr lang="en-ZA" smtClean="0"/>
-              <a:t>2013/06/20</a:t>
+              <a:t>2015/05/21</a:t>
             </a:fld>
             <a:endParaRPr lang="en-ZA"/>
           </a:p>
@@ -1426,7 +1426,6 @@
               <a:rPr lang="en-ZA" baseline="0" dirty="0" smtClean="0"/>
               <a:t>Let’s look at some code</a:t>
             </a:r>
-            <a:endParaRPr lang="en-ZA" baseline="0" dirty="0" smtClean="0"/>
           </a:p>
           <a:p>
             <a:endParaRPr lang="en-ZA" dirty="0"/>
@@ -3003,8 +3002,23 @@
             </a:pPr>
             <a:r>
               <a:rPr lang="en-ZA" baseline="0" dirty="0" smtClean="0"/>
-              <a:t>Lazy instantiation – depending on a delegate</a:t>
-            </a:r>
+              <a:t>Lazy instantiation – depending on a </a:t>
+            </a:r>
+            <a:r>
+              <a:rPr lang="en-ZA" baseline="0" dirty="0" smtClean="0"/>
+              <a:t>delegate</a:t>
+            </a:r>
+          </a:p>
+          <a:p>
+            <a:pPr marL="171450" indent="-171450">
+              <a:buFontTx/>
+              <a:buChar char="-"/>
+            </a:pPr>
+            <a:r>
+              <a:rPr lang="en-ZA" baseline="0" smtClean="0"/>
+              <a:t>Interception</a:t>
+            </a:r>
+            <a:endParaRPr lang="en-ZA" baseline="0" dirty="0" smtClean="0"/>
           </a:p>
           <a:p>
             <a:pPr marL="171450" indent="-171450">
@@ -4322,7 +4336,7 @@
           <a:p>
             <a:fld id="{21B3615F-C997-4548-8010-8AE8A36EAFCD}" type="datetimeFigureOut">
               <a:rPr lang="en-ZA" smtClean="0"/>
-              <a:t>2013/06/20</a:t>
+              <a:t>2015/05/21</a:t>
             </a:fld>
             <a:endParaRPr lang="en-ZA"/>
           </a:p>
@@ -4539,7 +4553,7 @@
           <a:p>
             <a:fld id="{21B3615F-C997-4548-8010-8AE8A36EAFCD}" type="datetimeFigureOut">
               <a:rPr lang="en-ZA" smtClean="0"/>
-              <a:t>2013/06/20</a:t>
+              <a:t>2015/05/21</a:t>
             </a:fld>
             <a:endParaRPr lang="en-ZA"/>
           </a:p>
@@ -4749,7 +4763,7 @@
           <a:p>
             <a:fld id="{21B3615F-C997-4548-8010-8AE8A36EAFCD}" type="datetimeFigureOut">
               <a:rPr lang="en-ZA" smtClean="0"/>
-              <a:t>2013/06/20</a:t>
+              <a:t>2015/05/21</a:t>
             </a:fld>
             <a:endParaRPr lang="en-ZA"/>
           </a:p>
@@ -4959,7 +4973,7 @@
           <a:p>
             <a:fld id="{21B3615F-C997-4548-8010-8AE8A36EAFCD}" type="datetimeFigureOut">
               <a:rPr lang="en-ZA" smtClean="0"/>
-              <a:t>2013/06/20</a:t>
+              <a:t>2015/05/21</a:t>
             </a:fld>
             <a:endParaRPr lang="en-ZA"/>
           </a:p>
@@ -5474,7 +5488,7 @@
           <a:p>
             <a:fld id="{21B3615F-C997-4548-8010-8AE8A36EAFCD}" type="datetimeFigureOut">
               <a:rPr lang="en-ZA" smtClean="0"/>
-              <a:t>2013/06/20</a:t>
+              <a:t>2015/05/21</a:t>
             </a:fld>
             <a:endParaRPr lang="en-ZA"/>
           </a:p>
@@ -5880,7 +5894,7 @@
           <a:p>
             <a:fld id="{21B3615F-C997-4548-8010-8AE8A36EAFCD}" type="datetimeFigureOut">
               <a:rPr lang="en-ZA" smtClean="0"/>
-              <a:t>2013/06/20</a:t>
+              <a:t>2015/05/21</a:t>
             </a:fld>
             <a:endParaRPr lang="en-ZA"/>
           </a:p>
@@ -6030,7 +6044,7 @@
           <a:p>
             <a:fld id="{21B3615F-C997-4548-8010-8AE8A36EAFCD}" type="datetimeFigureOut">
               <a:rPr lang="en-ZA" smtClean="0"/>
-              <a:t>2013/06/20</a:t>
+              <a:t>2015/05/21</a:t>
             </a:fld>
             <a:endParaRPr lang="en-ZA"/>
           </a:p>
@@ -6149,7 +6163,7 @@
           <a:p>
             <a:fld id="{21B3615F-C997-4548-8010-8AE8A36EAFCD}" type="datetimeFigureOut">
               <a:rPr lang="en-ZA" smtClean="0"/>
-              <a:t>2013/06/20</a:t>
+              <a:t>2015/05/21</a:t>
             </a:fld>
             <a:endParaRPr lang="en-ZA"/>
           </a:p>
@@ -6466,7 +6480,7 @@
           <a:p>
             <a:fld id="{21B3615F-C997-4548-8010-8AE8A36EAFCD}" type="datetimeFigureOut">
               <a:rPr lang="en-ZA" smtClean="0"/>
-              <a:t>2013/06/20</a:t>
+              <a:t>2015/05/21</a:t>
             </a:fld>
             <a:endParaRPr lang="en-ZA"/>
           </a:p>
@@ -6752,7 +6766,7 @@
           <a:p>
             <a:fld id="{21B3615F-C997-4548-8010-8AE8A36EAFCD}" type="datetimeFigureOut">
               <a:rPr lang="en-ZA" smtClean="0"/>
-              <a:t>2013/06/20</a:t>
+              <a:t>2015/05/21</a:t>
             </a:fld>
             <a:endParaRPr lang="en-ZA"/>
           </a:p>
@@ -7424,11 +7438,6 @@
               </a:rPr>
               <a:t>Class Exercise</a:t>
             </a:r>
-            <a:endParaRPr lang="en-ZA" sz="5400" dirty="0" smtClean="0">
-              <a:solidFill>
-                <a:srgbClr val="50FA22"/>
-              </a:solidFill>
-            </a:endParaRPr>
           </a:p>
         </p:txBody>
       </p:sp>
@@ -11059,31 +11068,7 @@
                 </a:highlight>
                 <a:latin typeface="Consolas" panose="020B0609020204030204" pitchFamily="49" charset="0"/>
               </a:rPr>
-              <a:t> </a:t>
-            </a:r>
-            <a:r>
-              <a:rPr lang="en-ZA" sz="2400" dirty="0">
-                <a:solidFill>
-                  <a:srgbClr val="000000"/>
-                </a:solidFill>
-                <a:highlight>
-                  <a:srgbClr val="FFFFFF"/>
-                </a:highlight>
-                <a:latin typeface="Consolas" panose="020B0609020204030204" pitchFamily="49" charset="0"/>
-              </a:rPr>
-              <a:t>View</a:t>
-            </a:r>
-            <a:r>
-              <a:rPr lang="en-ZA" sz="2400" dirty="0">
-                <a:solidFill>
-                  <a:srgbClr val="000000"/>
-                </a:solidFill>
-                <a:highlight>
-                  <a:srgbClr val="FFFFFF"/>
-                </a:highlight>
-                <a:latin typeface="Consolas" panose="020B0609020204030204" pitchFamily="49" charset="0"/>
-              </a:rPr>
-              <a:t>(</a:t>
+              <a:t> View(</a:t>
             </a:r>
             <a:r>
               <a:rPr lang="en-ZA" sz="2400" dirty="0" err="1">
@@ -12046,31 +12031,7 @@
                 </a:highlight>
                 <a:latin typeface="Consolas" panose="020B0609020204030204" pitchFamily="49" charset="0"/>
               </a:rPr>
-              <a:t> </a:t>
-            </a:r>
-            <a:r>
-              <a:rPr lang="en-ZA" sz="2400" dirty="0">
-                <a:solidFill>
-                  <a:srgbClr val="000000"/>
-                </a:solidFill>
-                <a:highlight>
-                  <a:srgbClr val="FFFFFF"/>
-                </a:highlight>
-                <a:latin typeface="Consolas" panose="020B0609020204030204" pitchFamily="49" charset="0"/>
-              </a:rPr>
-              <a:t>View</a:t>
-            </a:r>
-            <a:r>
-              <a:rPr lang="en-ZA" sz="2400" dirty="0">
-                <a:solidFill>
-                  <a:srgbClr val="000000"/>
-                </a:solidFill>
-                <a:highlight>
-                  <a:srgbClr val="FFFFFF"/>
-                </a:highlight>
-                <a:latin typeface="Consolas" panose="020B0609020204030204" pitchFamily="49" charset="0"/>
-              </a:rPr>
-              <a:t>(</a:t>
+              <a:t> View(</a:t>
             </a:r>
             <a:r>
               <a:rPr lang="en-ZA" sz="2400" dirty="0" err="1">
@@ -13261,31 +13222,7 @@
                 </a:highlight>
                 <a:latin typeface="Consolas" panose="020B0609020204030204" pitchFamily="49" charset="0"/>
               </a:rPr>
-              <a:t> </a:t>
-            </a:r>
-            <a:r>
-              <a:rPr lang="en-ZA" sz="2400" dirty="0">
-                <a:solidFill>
-                  <a:srgbClr val="000000"/>
-                </a:solidFill>
-                <a:highlight>
-                  <a:srgbClr val="FFFFFF"/>
-                </a:highlight>
-                <a:latin typeface="Consolas" panose="020B0609020204030204" pitchFamily="49" charset="0"/>
-              </a:rPr>
-              <a:t>View</a:t>
-            </a:r>
-            <a:r>
-              <a:rPr lang="en-ZA" sz="2400" dirty="0">
-                <a:solidFill>
-                  <a:srgbClr val="000000"/>
-                </a:solidFill>
-                <a:highlight>
-                  <a:srgbClr val="FFFFFF"/>
-                </a:highlight>
-                <a:latin typeface="Consolas" panose="020B0609020204030204" pitchFamily="49" charset="0"/>
-              </a:rPr>
-              <a:t>(</a:t>
+              <a:t> View(</a:t>
             </a:r>
             <a:r>
               <a:rPr lang="en-ZA" sz="2400" dirty="0" err="1">
@@ -13441,11 +13378,6 @@
               </a:rPr>
               <a:t>how do we give them their worms?</a:t>
             </a:r>
-            <a:endParaRPr lang="en-ZA" sz="5400" dirty="0" smtClean="0">
-              <a:solidFill>
-                <a:srgbClr val="50FA22"/>
-              </a:solidFill>
-            </a:endParaRPr>
           </a:p>
         </p:txBody>
       </p:sp>
@@ -14161,11 +14093,6 @@
               </a:rPr>
               <a:t>Disadvantages</a:t>
             </a:r>
-            <a:endParaRPr lang="en-ZA" sz="5400" dirty="0" smtClean="0">
-              <a:solidFill>
-                <a:srgbClr val="50FA22"/>
-              </a:solidFill>
-            </a:endParaRPr>
           </a:p>
         </p:txBody>
       </p:sp>
@@ -14245,11 +14172,6 @@
               </a:rPr>
               <a:t>Intermediate and advanced usage</a:t>
             </a:r>
-            <a:endParaRPr lang="en-ZA" sz="5400" dirty="0" smtClean="0">
-              <a:solidFill>
-                <a:srgbClr val="50FA22"/>
-              </a:solidFill>
-            </a:endParaRPr>
           </a:p>
         </p:txBody>
       </p:sp>
@@ -14329,11 +14251,6 @@
               </a:rPr>
               <a:t>Conclusion</a:t>
             </a:r>
-            <a:endParaRPr lang="en-ZA" sz="5400" dirty="0" smtClean="0">
-              <a:solidFill>
-                <a:srgbClr val="50FA22"/>
-              </a:solidFill>
-            </a:endParaRPr>
           </a:p>
         </p:txBody>
       </p:sp>

</xml_diff>